<commit_message>
slide generation with colors done - Step 5 done
</commit_message>
<xml_diff>
--- a/test_brand_colors.pptx
+++ b/test_brand_colors.pptx
@@ -3114,7 +3114,7 @@
             <a:r>
               <a:rPr sz="2400" b="1">
                 <a:solidFill>
-                  <a:srgbClr val="183A58"/>
+                  <a:srgbClr val="FF0000"/>
                 </a:solidFill>
                 <a:latin typeface="Arial"/>
               </a:rPr>
@@ -3138,7 +3138,7 @@
             <a:avLst/>
           </a:prstGeom>
           <a:solidFill>
-            <a:srgbClr val="183A58"/>
+            <a:srgbClr val="FF0000"/>
           </a:solidFill>
           <a:ln>
             <a:noFill/>
@@ -3191,7 +3191,7 @@
             <a:pPr algn="l">
               <a:defRPr sz="1400" b="1">
                 <a:solidFill>
-                  <a:srgbClr val="183A58"/>
+                  <a:srgbClr val="FF0000"/>
                 </a:solidFill>
                 <a:latin typeface="Arial"/>
               </a:defRPr>
@@ -3228,13 +3228,13 @@
               </a:lnSpc>
               <a:defRPr sz="1100">
                 <a:solidFill>
-                  <a:srgbClr val="404040"/>
+                  <a:srgbClr val="FFA500"/>
                 </a:solidFill>
                 <a:latin typeface="Arial"/>
               </a:defRPr>
             </a:pPr>
             <a:r>
-              <a:t>• 20+ years experience</a:t>
+              <a:t>• Led company growth</a:t>
             </a:r>
           </a:p>
         </p:txBody>
@@ -3265,13 +3265,13 @@
               </a:lnSpc>
               <a:defRPr sz="1100">
                 <a:solidFill>
-                  <a:srgbClr val="404040"/>
+                  <a:srgbClr val="FFA500"/>
                 </a:solidFill>
                 <a:latin typeface="Arial"/>
               </a:defRPr>
             </a:pPr>
             <a:r>
-              <a:t>• Former Fortune 500 executive</a:t>
+              <a:t>• Strategic vision</a:t>
             </a:r>
           </a:p>
         </p:txBody>
@@ -3284,7 +3284,43 @@
         </p:nvSpPr>
         <p:spPr>
           <a:xfrm>
-            <a:off x="274320" y="2459736"/>
+            <a:off x="274320" y="2551176"/>
+            <a:ext cx="3657600" cy="320040"/>
+          </a:xfrm>
+          <a:prstGeom prst="rect">
+            <a:avLst/>
+          </a:prstGeom>
+          <a:noFill/>
+        </p:spPr>
+        <p:txBody>
+          <a:bodyPr wrap="square" lIns="36576" rIns="36576" tIns="14630" bIns="14630">
+            <a:spAutoFit/>
+          </a:bodyPr>
+          <a:lstStyle/>
+          <a:p>
+            <a:pPr algn="l">
+              <a:defRPr sz="1400" b="1">
+                <a:solidFill>
+                  <a:srgbClr val="FF0000"/>
+                </a:solidFill>
+                <a:latin typeface="Arial"/>
+              </a:defRPr>
+            </a:pPr>
+            <a:r>
+              <a:t>CFO</a:t>
+            </a:r>
+          </a:p>
+        </p:txBody>
+      </p:sp>
+      <p:sp>
+        <p:nvSpPr>
+          <p:cNvPr id="8" name="TextBox 7"/>
+          <p:cNvSpPr txBox="1"/>
+          <p:nvPr/>
+        </p:nvSpPr>
+        <p:spPr>
+          <a:xfrm>
+            <a:off x="274320" y="2916936"/>
             <a:ext cx="3657600" cy="329184"/>
           </a:xfrm>
           <a:prstGeom prst="rect">
@@ -3302,49 +3338,13 @@
               </a:lnSpc>
               <a:defRPr sz="1100">
                 <a:solidFill>
-                  <a:srgbClr val="404040"/>
+                  <a:srgbClr val="FFA500"/>
                 </a:solidFill>
                 <a:latin typeface="Arial"/>
               </a:defRPr>
             </a:pPr>
             <a:r>
-              <a:t>• MBA from Harvard</a:t>
-            </a:r>
-          </a:p>
-        </p:txBody>
-      </p:sp>
-      <p:sp>
-        <p:nvSpPr>
-          <p:cNvPr id="8" name="TextBox 7"/>
-          <p:cNvSpPr txBox="1"/>
-          <p:nvPr/>
-        </p:nvSpPr>
-        <p:spPr>
-          <a:xfrm>
-            <a:off x="274320" y="2935224"/>
-            <a:ext cx="3657600" cy="320040"/>
-          </a:xfrm>
-          <a:prstGeom prst="rect">
-            <a:avLst/>
-          </a:prstGeom>
-          <a:noFill/>
-        </p:spPr>
-        <p:txBody>
-          <a:bodyPr wrap="square" lIns="36576" rIns="36576" tIns="14630" bIns="14630">
-            <a:spAutoFit/>
-          </a:bodyPr>
-          <a:lstStyle/>
-          <a:p>
-            <a:pPr algn="l">
-              <a:defRPr sz="1400" b="1">
-                <a:solidFill>
-                  <a:srgbClr val="183A58"/>
-                </a:solidFill>
-                <a:latin typeface="Arial"/>
-              </a:defRPr>
-            </a:pPr>
-            <a:r>
-              <a:t>CFO</a:t>
+              <a:t>• Financial management</a:t>
             </a:r>
           </a:p>
         </p:txBody>
@@ -3375,13 +3375,13 @@
               </a:lnSpc>
               <a:defRPr sz="1100">
                 <a:solidFill>
-                  <a:srgbClr val="404040"/>
+                  <a:srgbClr val="FFA500"/>
                 </a:solidFill>
                 <a:latin typeface="Arial"/>
               </a:defRPr>
             </a:pPr>
             <a:r>
-              <a:t>• 15+ years finance</a:t>
+              <a:t>• Investor relations</a:t>
             </a:r>
           </a:p>
         </p:txBody>
@@ -3389,80 +3389,6 @@
       <p:sp>
         <p:nvSpPr>
           <p:cNvPr id="10" name="TextBox 9"/>
-          <p:cNvSpPr txBox="1"/>
-          <p:nvPr/>
-        </p:nvSpPr>
-        <p:spPr>
-          <a:xfrm>
-            <a:off x="274320" y="3685032"/>
-            <a:ext cx="3657600" cy="329184"/>
-          </a:xfrm>
-          <a:prstGeom prst="rect">
-            <a:avLst/>
-          </a:prstGeom>
-          <a:noFill/>
-        </p:spPr>
-        <p:txBody>
-          <a:bodyPr wrap="square" lIns="36576" rIns="36576" tIns="10972" bIns="10972"/>
-          <a:lstStyle/>
-          <a:p>
-            <a:pPr algn="l">
-              <a:lnSpc>
-                <a:spcPct val="120000"/>
-              </a:lnSpc>
-              <a:defRPr sz="1100">
-                <a:solidFill>
-                  <a:srgbClr val="404040"/>
-                </a:solidFill>
-                <a:latin typeface="Arial"/>
-              </a:defRPr>
-            </a:pPr>
-            <a:r>
-              <a:t>• CPA certified</a:t>
-            </a:r>
-          </a:p>
-        </p:txBody>
-      </p:sp>
-      <p:sp>
-        <p:nvSpPr>
-          <p:cNvPr id="11" name="TextBox 10"/>
-          <p:cNvSpPr txBox="1"/>
-          <p:nvPr/>
-        </p:nvSpPr>
-        <p:spPr>
-          <a:xfrm>
-            <a:off x="274320" y="4069080"/>
-            <a:ext cx="3657600" cy="329184"/>
-          </a:xfrm>
-          <a:prstGeom prst="rect">
-            <a:avLst/>
-          </a:prstGeom>
-          <a:noFill/>
-        </p:spPr>
-        <p:txBody>
-          <a:bodyPr wrap="square" lIns="36576" rIns="36576" tIns="10972" bIns="10972"/>
-          <a:lstStyle/>
-          <a:p>
-            <a:pPr algn="l">
-              <a:lnSpc>
-                <a:spcPct val="120000"/>
-              </a:lnSpc>
-              <a:defRPr sz="1100">
-                <a:solidFill>
-                  <a:srgbClr val="404040"/>
-                </a:solidFill>
-                <a:latin typeface="Arial"/>
-              </a:defRPr>
-            </a:pPr>
-            <a:r>
-              <a:t>• Former Big 4 partner</a:t>
-            </a:r>
-          </a:p>
-        </p:txBody>
-      </p:sp>
-      <p:sp>
-        <p:nvSpPr>
-          <p:cNvPr id="12" name="TextBox 11"/>
           <p:cNvSpPr txBox="1"/>
           <p:nvPr/>
         </p:nvSpPr>
@@ -3498,7 +3424,7 @@
       </p:sp>
       <p:sp>
         <p:nvSpPr>
-          <p:cNvPr id="13" name="TextBox 12"/>
+          <p:cNvPr id="11" name="TextBox 10"/>
           <p:cNvSpPr txBox="1"/>
           <p:nvPr/>
         </p:nvSpPr>

</xml_diff>